<commit_message>
added he v2Apis.py module. you can now fetch @get /v2/user with implicit user found in either sessionKey cookie or  by url hacker_id param
</commit_message>
<xml_diff>
--- a/docs/reactive app flows.pptx
+++ b/docs/reactive app flows.pptx
@@ -107,6 +107,11 @@
       </a:defRPr>
     </a:lvl9pPr>
   </p:defaultTextStyle>
+  <p:extLst>
+    <p:ext uri="{EFAFB233-063F-42B5-8137-9DF3F51BA10A}">
+      <p15:sldGuideLst xmlns:p15="http://schemas.microsoft.com/office/powerpoint/2012/main"/>
+    </p:ext>
+  </p:extLst>
 </p:presentation>
 </file>
 
@@ -508,7 +513,7 @@
           <a:p>
             <a:fld id="{304D851E-9C1B-4959-9B63-217201591B31}" type="datetimeFigureOut">
               <a:rPr lang="en-US" smtClean="0"/>
-              <a:t>2025-04-15</a:t>
+              <a:t>4/17/2025</a:t>
             </a:fld>
             <a:endParaRPr lang="en-US"/>
           </a:p>
@@ -706,7 +711,7 @@
           <a:p>
             <a:fld id="{304D851E-9C1B-4959-9B63-217201591B31}" type="datetimeFigureOut">
               <a:rPr lang="en-US" smtClean="0"/>
-              <a:t>2025-04-15</a:t>
+              <a:t>4/17/2025</a:t>
             </a:fld>
             <a:endParaRPr lang="en-US"/>
           </a:p>
@@ -914,7 +919,7 @@
           <a:p>
             <a:fld id="{304D851E-9C1B-4959-9B63-217201591B31}" type="datetimeFigureOut">
               <a:rPr lang="en-US" smtClean="0"/>
-              <a:t>2025-04-15</a:t>
+              <a:t>4/17/2025</a:t>
             </a:fld>
             <a:endParaRPr lang="en-US"/>
           </a:p>
@@ -1112,7 +1117,7 @@
           <a:p>
             <a:fld id="{304D851E-9C1B-4959-9B63-217201591B31}" type="datetimeFigureOut">
               <a:rPr lang="en-US" smtClean="0"/>
-              <a:t>2025-04-15</a:t>
+              <a:t>4/17/2025</a:t>
             </a:fld>
             <a:endParaRPr lang="en-US"/>
           </a:p>
@@ -1387,7 +1392,7 @@
           <a:p>
             <a:fld id="{304D851E-9C1B-4959-9B63-217201591B31}" type="datetimeFigureOut">
               <a:rPr lang="en-US" smtClean="0"/>
-              <a:t>2025-04-15</a:t>
+              <a:t>4/17/2025</a:t>
             </a:fld>
             <a:endParaRPr lang="en-US"/>
           </a:p>
@@ -1652,7 +1657,7 @@
           <a:p>
             <a:fld id="{304D851E-9C1B-4959-9B63-217201591B31}" type="datetimeFigureOut">
               <a:rPr lang="en-US" smtClean="0"/>
-              <a:t>2025-04-15</a:t>
+              <a:t>4/17/2025</a:t>
             </a:fld>
             <a:endParaRPr lang="en-US"/>
           </a:p>
@@ -2064,7 +2069,7 @@
           <a:p>
             <a:fld id="{304D851E-9C1B-4959-9B63-217201591B31}" type="datetimeFigureOut">
               <a:rPr lang="en-US" smtClean="0"/>
-              <a:t>2025-04-15</a:t>
+              <a:t>4/17/2025</a:t>
             </a:fld>
             <a:endParaRPr lang="en-US"/>
           </a:p>
@@ -2205,7 +2210,7 @@
           <a:p>
             <a:fld id="{304D851E-9C1B-4959-9B63-217201591B31}" type="datetimeFigureOut">
               <a:rPr lang="en-US" smtClean="0"/>
-              <a:t>2025-04-15</a:t>
+              <a:t>4/17/2025</a:t>
             </a:fld>
             <a:endParaRPr lang="en-US"/>
           </a:p>
@@ -2318,7 +2323,7 @@
           <a:p>
             <a:fld id="{304D851E-9C1B-4959-9B63-217201591B31}" type="datetimeFigureOut">
               <a:rPr lang="en-US" smtClean="0"/>
-              <a:t>2025-04-15</a:t>
+              <a:t>4/17/2025</a:t>
             </a:fld>
             <a:endParaRPr lang="en-US"/>
           </a:p>
@@ -2629,7 +2634,7 @@
           <a:p>
             <a:fld id="{304D851E-9C1B-4959-9B63-217201591B31}" type="datetimeFigureOut">
               <a:rPr lang="en-US" smtClean="0"/>
-              <a:t>2025-04-15</a:t>
+              <a:t>4/17/2025</a:t>
             </a:fld>
             <a:endParaRPr lang="en-US"/>
           </a:p>
@@ -2917,7 +2922,7 @@
           <a:p>
             <a:fld id="{304D851E-9C1B-4959-9B63-217201591B31}" type="datetimeFigureOut">
               <a:rPr lang="en-US" smtClean="0"/>
-              <a:t>2025-04-15</a:t>
+              <a:t>4/17/2025</a:t>
             </a:fld>
             <a:endParaRPr lang="en-US"/>
           </a:p>
@@ -3158,7 +3163,7 @@
           <a:p>
             <a:fld id="{304D851E-9C1B-4959-9B63-217201591B31}" type="datetimeFigureOut">
               <a:rPr lang="en-US" smtClean="0"/>
-              <a:t>2025-04-15</a:t>
+              <a:t>4/17/2025</a:t>
             </a:fld>
             <a:endParaRPr lang="en-US"/>
           </a:p>
@@ -6108,11 +6113,7 @@
             </a:r>
             <a:r>
               <a:rPr lang="en-US" sz="1200" dirty="0"/>
-              <a:t>”:  </a:t>
-            </a:r>
-            <a:r>
-              <a:rPr lang="en-US" sz="1200"/>
-              <a:t>		&lt; </a:t>
+              <a:t>”:  		&lt; </a:t>
             </a:r>
             <a:r>
               <a:rPr lang="en-US" sz="1200" dirty="0" err="1"/>
@@ -6207,19 +6208,27 @@
             </a:r>
             <a:r>
               <a:rPr lang="en-US" sz="1200" dirty="0"/>
-              <a:t>”:	[{&lt;</a:t>
-            </a:r>
-            <a:r>
-              <a:rPr lang="en-US" sz="1200" dirty="0" err="1">
+              <a:t>”:</a:t>
+            </a:r>
+            <a:r>
+              <a:rPr lang="en-US" sz="1200"/>
+              <a:t>	[&lt;</a:t>
+            </a:r>
+            <a:r>
+              <a:rPr lang="en-US" sz="1200">
                 <a:solidFill>
                   <a:srgbClr val="FF0000"/>
                 </a:solidFill>
               </a:rPr>
-              <a:t>taskSubmissionJson</a:t>
+              <a:t> taskSubmissionBase64EncodedTxt </a:t>
+            </a:r>
+            <a:r>
+              <a:rPr lang="en-US" sz="1200"/>
+              <a:t>&gt;, </a:t>
             </a:r>
             <a:r>
               <a:rPr lang="en-US" sz="1200" dirty="0"/>
-              <a:t>&gt;}, {&lt;</a:t>
+              <a:t>&lt;</a:t>
             </a:r>
             <a:r>
               <a:rPr lang="en-US" sz="1200" dirty="0">
@@ -6227,23 +6236,7 @@
                   <a:srgbClr val="FF0000"/>
                 </a:solidFill>
               </a:rPr>
-              <a:t> </a:t>
-            </a:r>
-            <a:r>
-              <a:rPr lang="en-US" sz="1200" dirty="0" err="1">
-                <a:solidFill>
-                  <a:srgbClr val="FF0000"/>
-                </a:solidFill>
-              </a:rPr>
-              <a:t>taskSubmissionJson</a:t>
-            </a:r>
-            <a:r>
-              <a:rPr lang="en-US" sz="1200" dirty="0">
-                <a:solidFill>
-                  <a:srgbClr val="FF0000"/>
-                </a:solidFill>
-              </a:rPr>
-              <a:t> </a:t>
+              <a:t> taskSubmissionBase64EncodedTxt </a:t>
             </a:r>
             <a:r>
               <a:rPr lang="en-US" sz="1200" dirty="0"/>

</xml_diff>